<commit_message>
Revised to deal with small design issues. Revised manufacturing drawings to inches per request of MAE Research Shop. AA
</commit_message>
<xml_diff>
--- a/documentation/kiteCAD/solidworks/Line Angle Sensor/Line Angle Sensor Design.pptx
+++ b/documentation/kiteCAD/solidworks/Line Angle Sensor/Line Angle Sensor Design.pptx
@@ -11,6 +11,8 @@
     <p:sldId id="257" r:id="rId5"/>
     <p:sldId id="259" r:id="rId6"/>
     <p:sldId id="260" r:id="rId7"/>
+    <p:sldId id="262" r:id="rId8"/>
+    <p:sldId id="263" r:id="rId9"/>
   </p:sldIdLst>
   <p:sldSz cx="12192000" cy="6858000"/>
   <p:notesSz cx="6858000" cy="9144000"/>
@@ -109,6 +111,11 @@
       </a:defRPr>
     </a:lvl9pPr>
   </p:defaultTextStyle>
+  <p:extLst>
+    <p:ext uri="{EFAFB233-063F-42B5-8137-9DF3F51BA10A}">
+      <p15:sldGuideLst xmlns:p15="http://schemas.microsoft.com/office/powerpoint/2012/main"/>
+    </p:ext>
+  </p:extLst>
 </p:presentation>
 </file>
 
@@ -259,7 +266,7 @@
           <a:p>
             <a:fld id="{63F6F521-D239-482F-8F93-B8BD4D6E2FCE}" type="datetimeFigureOut">
               <a:rPr lang="en-US" smtClean="0"/>
-              <a:t>9/1/2020</a:t>
+              <a:t>9/2/2020</a:t>
             </a:fld>
             <a:endParaRPr lang="en-US"/>
           </a:p>
@@ -457,7 +464,7 @@
           <a:p>
             <a:fld id="{63F6F521-D239-482F-8F93-B8BD4D6E2FCE}" type="datetimeFigureOut">
               <a:rPr lang="en-US" smtClean="0"/>
-              <a:t>9/1/2020</a:t>
+              <a:t>9/2/2020</a:t>
             </a:fld>
             <a:endParaRPr lang="en-US"/>
           </a:p>
@@ -665,7 +672,7 @@
           <a:p>
             <a:fld id="{63F6F521-D239-482F-8F93-B8BD4D6E2FCE}" type="datetimeFigureOut">
               <a:rPr lang="en-US" smtClean="0"/>
-              <a:t>9/1/2020</a:t>
+              <a:t>9/2/2020</a:t>
             </a:fld>
             <a:endParaRPr lang="en-US"/>
           </a:p>
@@ -863,7 +870,7 @@
           <a:p>
             <a:fld id="{63F6F521-D239-482F-8F93-B8BD4D6E2FCE}" type="datetimeFigureOut">
               <a:rPr lang="en-US" smtClean="0"/>
-              <a:t>9/1/2020</a:t>
+              <a:t>9/2/2020</a:t>
             </a:fld>
             <a:endParaRPr lang="en-US"/>
           </a:p>
@@ -1138,7 +1145,7 @@
           <a:p>
             <a:fld id="{63F6F521-D239-482F-8F93-B8BD4D6E2FCE}" type="datetimeFigureOut">
               <a:rPr lang="en-US" smtClean="0"/>
-              <a:t>9/1/2020</a:t>
+              <a:t>9/2/2020</a:t>
             </a:fld>
             <a:endParaRPr lang="en-US"/>
           </a:p>
@@ -1403,7 +1410,7 @@
           <a:p>
             <a:fld id="{63F6F521-D239-482F-8F93-B8BD4D6E2FCE}" type="datetimeFigureOut">
               <a:rPr lang="en-US" smtClean="0"/>
-              <a:t>9/1/2020</a:t>
+              <a:t>9/2/2020</a:t>
             </a:fld>
             <a:endParaRPr lang="en-US"/>
           </a:p>
@@ -1815,7 +1822,7 @@
           <a:p>
             <a:fld id="{63F6F521-D239-482F-8F93-B8BD4D6E2FCE}" type="datetimeFigureOut">
               <a:rPr lang="en-US" smtClean="0"/>
-              <a:t>9/1/2020</a:t>
+              <a:t>9/2/2020</a:t>
             </a:fld>
             <a:endParaRPr lang="en-US"/>
           </a:p>
@@ -1956,7 +1963,7 @@
           <a:p>
             <a:fld id="{63F6F521-D239-482F-8F93-B8BD4D6E2FCE}" type="datetimeFigureOut">
               <a:rPr lang="en-US" smtClean="0"/>
-              <a:t>9/1/2020</a:t>
+              <a:t>9/2/2020</a:t>
             </a:fld>
             <a:endParaRPr lang="en-US"/>
           </a:p>
@@ -2069,7 +2076,7 @@
           <a:p>
             <a:fld id="{63F6F521-D239-482F-8F93-B8BD4D6E2FCE}" type="datetimeFigureOut">
               <a:rPr lang="en-US" smtClean="0"/>
-              <a:t>9/1/2020</a:t>
+              <a:t>9/2/2020</a:t>
             </a:fld>
             <a:endParaRPr lang="en-US"/>
           </a:p>
@@ -2380,7 +2387,7 @@
           <a:p>
             <a:fld id="{63F6F521-D239-482F-8F93-B8BD4D6E2FCE}" type="datetimeFigureOut">
               <a:rPr lang="en-US" smtClean="0"/>
-              <a:t>9/1/2020</a:t>
+              <a:t>9/2/2020</a:t>
             </a:fld>
             <a:endParaRPr lang="en-US"/>
           </a:p>
@@ -2668,7 +2675,7 @@
           <a:p>
             <a:fld id="{63F6F521-D239-482F-8F93-B8BD4D6E2FCE}" type="datetimeFigureOut">
               <a:rPr lang="en-US" smtClean="0"/>
-              <a:t>9/1/2020</a:t>
+              <a:t>9/2/2020</a:t>
             </a:fld>
             <a:endParaRPr lang="en-US"/>
           </a:p>
@@ -2909,7 +2916,7 @@
           <a:p>
             <a:fld id="{63F6F521-D239-482F-8F93-B8BD4D6E2FCE}" type="datetimeFigureOut">
               <a:rPr lang="en-US" smtClean="0"/>
-              <a:t>9/1/2020</a:t>
+              <a:t>9/2/2020</a:t>
             </a:fld>
             <a:endParaRPr lang="en-US"/>
           </a:p>
@@ -3466,12 +3473,6 @@
           <a:p>
             <a:r>
               <a:rPr lang="en-US" dirty="0"/>
-              <a:t>Sensor Choice</a:t>
-            </a:r>
-          </a:p>
-          <a:p>
-            <a:r>
-              <a:rPr lang="en-US" dirty="0"/>
               <a:t>Pivot Arm and Lower Pivot</a:t>
             </a:r>
           </a:p>
@@ -3701,13 +3702,13 @@
         <p:spPr/>
         <p:txBody>
           <a:bodyPr>
-            <a:normAutofit fontScale="92500"/>
+            <a:normAutofit fontScale="92500" lnSpcReduction="10000"/>
           </a:bodyPr>
           <a:lstStyle/>
           <a:p>
             <a:r>
               <a:rPr lang="en-US" dirty="0"/>
-              <a:t>All 316 Construction</a:t>
+              <a:t>All 316 Construction	</a:t>
             </a:r>
           </a:p>
           <a:p>
@@ -3740,7 +3741,7 @@
           <a:p>
             <a:r>
               <a:rPr lang="en-US" dirty="0"/>
-              <a:t>Design preloads the pivot on arm against the non sensed bearing.</a:t>
+              <a:t>Design preloads the pivot on arm against the passive side of the assembly.</a:t>
             </a:r>
           </a:p>
           <a:p>
@@ -3750,10 +3751,10 @@
       </p:sp>
       <p:pic>
         <p:nvPicPr>
-          <p:cNvPr id="6" name="Content Placeholder 5">
-            <a:extLst>
-              <a:ext uri="{FF2B5EF4-FFF2-40B4-BE49-F238E27FC236}">
-                <a16:creationId xmlns:a16="http://schemas.microsoft.com/office/drawing/2014/main" id="{8C38B975-614A-4958-B50B-911A36506B79}"/>
+          <p:cNvPr id="8" name="Content Placeholder 7">
+            <a:extLst>
+              <a:ext uri="{FF2B5EF4-FFF2-40B4-BE49-F238E27FC236}">
+                <a16:creationId xmlns:a16="http://schemas.microsoft.com/office/drawing/2014/main" id="{08BAAD5B-84A8-468D-82CE-290AD87EB167}"/>
               </a:ext>
             </a:extLst>
           </p:cNvPr>
@@ -3772,8 +3773,8 @@
         </p:blipFill>
         <p:spPr>
           <a:xfrm>
-            <a:off x="6172200" y="2388239"/>
-            <a:ext cx="5181600" cy="3226109"/>
+            <a:off x="6172200" y="2335571"/>
+            <a:ext cx="5181600" cy="3331446"/>
           </a:xfrm>
           <a:prstGeom prst="rect">
             <a:avLst/>
@@ -4079,34 +4080,34 @@
           <a:lstStyle/>
           <a:p>
             <a:r>
-              <a:rPr lang="en-US" sz="1800"/>
+              <a:rPr lang="en-US" sz="1800" dirty="0"/>
               <a:t>Tether Arm is attached to the pivot using a ¼” 316 shoulder bolt cross-drilled through the pivot and the arm.</a:t>
             </a:r>
           </a:p>
           <a:p>
             <a:pPr lvl="1"/>
             <a:r>
-              <a:rPr lang="en-US" sz="1800"/>
+              <a:rPr lang="en-US" sz="1800" dirty="0"/>
               <a:t>Reliably and repeatably attach the arm and the pivot.</a:t>
             </a:r>
           </a:p>
           <a:p>
             <a:r>
-              <a:rPr lang="en-US" sz="1800"/>
+              <a:rPr lang="en-US" sz="1800" dirty="0"/>
               <a:t>Similar method is used at the far end of the tether arm to attach the tether guide.</a:t>
             </a:r>
           </a:p>
           <a:p>
-            <a:endParaRPr lang="en-US" sz="1800"/>
+            <a:endParaRPr lang="en-US" sz="1800" dirty="0"/>
           </a:p>
         </p:txBody>
       </p:sp>
       <p:pic>
         <p:nvPicPr>
-          <p:cNvPr id="7" name="Content Placeholder 6">
-            <a:extLst>
-              <a:ext uri="{FF2B5EF4-FFF2-40B4-BE49-F238E27FC236}">
-                <a16:creationId xmlns:a16="http://schemas.microsoft.com/office/drawing/2014/main" id="{0D0E74BB-5666-4C7E-8F61-4F62AF17FDA7}"/>
+          <p:cNvPr id="8" name="Content Placeholder 7">
+            <a:extLst>
+              <a:ext uri="{FF2B5EF4-FFF2-40B4-BE49-F238E27FC236}">
+                <a16:creationId xmlns:a16="http://schemas.microsoft.com/office/drawing/2014/main" id="{40C40841-EBC6-4A8A-B34A-311CE5DB67BC}"/>
               </a:ext>
             </a:extLst>
           </p:cNvPr>
@@ -4117,61 +4118,20 @@
             <p:ph sz="half" idx="2"/>
           </p:nvPr>
         </p:nvPicPr>
-        <p:blipFill rotWithShape="1">
+        <p:blipFill>
           <a:blip r:embed="rId2"/>
-          <a:srcRect l="14244" r="11476"/>
-          <a:stretch/>
+          <a:stretch>
+            <a:fillRect/>
+          </a:stretch>
         </p:blipFill>
         <p:spPr>
           <a:xfrm>
-            <a:off x="5308052" y="10"/>
-            <a:ext cx="6883948" cy="6857990"/>
+            <a:off x="6172200" y="2230633"/>
+            <a:ext cx="5181600" cy="3541321"/>
           </a:xfrm>
-          <a:custGeom>
+          <a:prstGeom prst="rect">
             <a:avLst/>
-            <a:gdLst/>
-            <a:ahLst/>
-            <a:cxnLst/>
-            <a:rect l="l" t="t" r="r" b="b"/>
-            <a:pathLst>
-              <a:path w="6883948" h="6858000">
-                <a:moveTo>
-                  <a:pt x="365648" y="0"/>
-                </a:moveTo>
-                <a:lnTo>
-                  <a:pt x="6883948" y="0"/>
-                </a:lnTo>
-                <a:lnTo>
-                  <a:pt x="6883948" y="6858000"/>
-                </a:lnTo>
-                <a:lnTo>
-                  <a:pt x="365648" y="6858000"/>
-                </a:lnTo>
-                <a:lnTo>
-                  <a:pt x="360213" y="6835050"/>
-                </a:lnTo>
-                <a:cubicBezTo>
-                  <a:pt x="128263" y="5788167"/>
-                  <a:pt x="0" y="4637179"/>
-                  <a:pt x="0" y="3429001"/>
-                </a:cubicBezTo>
-                <a:cubicBezTo>
-                  <a:pt x="0" y="2220824"/>
-                  <a:pt x="128263" y="1069835"/>
-                  <a:pt x="360213" y="22952"/>
-                </a:cubicBezTo>
-                <a:close/>
-              </a:path>
-            </a:pathLst>
-          </a:custGeom>
-          <a:effectLst>
-            <a:outerShdw blurRad="50800" dist="38100" dir="10800000" algn="r" rotWithShape="0">
-              <a:schemeClr val="bg1">
-                <a:lumMod val="85000"/>
-                <a:alpha val="30000"/>
-              </a:schemeClr>
-            </a:outerShdw>
-          </a:effectLst>
+          </a:prstGeom>
         </p:spPr>
       </p:pic>
     </p:spTree>
@@ -4997,21 +4957,21 @@
           <a:p>
             <a:r>
               <a:rPr lang="en-US" sz="2000" dirty="0"/>
-              <a:t>Each half of the pivot joint is attached </a:t>
+              <a:t>Each half of the pivot joint is attached to the pivot for the upper axis.</a:t>
+            </a:r>
+          </a:p>
+          <a:p>
+            <a:r>
+              <a:rPr lang="en-US" sz="2000" dirty="0"/>
+              <a:t>Single </a:t>
             </a:r>
             <a:r>
               <a:rPr lang="en-US" sz="2000" dirty="0" err="1"/>
-              <a:t>attached</a:t>
+              <a:t>peice</a:t>
             </a:r>
             <a:r>
               <a:rPr lang="en-US" sz="2000" dirty="0"/>
-              <a:t> to the pivot for the upper axis.</a:t>
-            </a:r>
-          </a:p>
-          <a:p>
-            <a:r>
-              <a:rPr lang="en-US" sz="2000" dirty="0"/>
-              <a:t>Single pivot manufactured from 316. </a:t>
+              <a:t> manufactured from 316. </a:t>
             </a:r>
           </a:p>
           <a:p>
@@ -5040,6 +5000,412 @@
     <p:extLst>
       <p:ext uri="{BB962C8B-B14F-4D97-AF65-F5344CB8AC3E}">
         <p14:creationId xmlns:p14="http://schemas.microsoft.com/office/powerpoint/2010/main" val="2652485296"/>
+      </p:ext>
+    </p:extLst>
+  </p:cSld>
+  <p:clrMapOvr>
+    <a:masterClrMapping/>
+  </p:clrMapOvr>
+</p:sld>
+</file>
+
+<file path=ppt/slides/slide7.xml><?xml version="1.0" encoding="utf-8"?>
+<p:sld xmlns:a="http://schemas.openxmlformats.org/drawingml/2006/main" xmlns:r="http://schemas.openxmlformats.org/officeDocument/2006/relationships" xmlns:p="http://schemas.openxmlformats.org/presentationml/2006/main">
+  <p:cSld>
+    <p:spTree>
+      <p:nvGrpSpPr>
+        <p:cNvPr id="1" name=""/>
+        <p:cNvGrpSpPr/>
+        <p:nvPr/>
+      </p:nvGrpSpPr>
+      <p:grpSpPr>
+        <a:xfrm>
+          <a:off x="0" y="0"/>
+          <a:ext cx="0" cy="0"/>
+          <a:chOff x="0" y="0"/>
+          <a:chExt cx="0" cy="0"/>
+        </a:xfrm>
+      </p:grpSpPr>
+      <p:sp>
+        <p:nvSpPr>
+          <p:cNvPr id="2" name="Title 1">
+            <a:extLst>
+              <a:ext uri="{FF2B5EF4-FFF2-40B4-BE49-F238E27FC236}">
+                <a16:creationId xmlns:a16="http://schemas.microsoft.com/office/drawing/2014/main" id="{78B48FFB-D878-4B36-88FC-E45568D9E96B}"/>
+              </a:ext>
+            </a:extLst>
+          </p:cNvPr>
+          <p:cNvSpPr>
+            <a:spLocks noGrp="1"/>
+          </p:cNvSpPr>
+          <p:nvPr>
+            <p:ph type="title"/>
+          </p:nvPr>
+        </p:nvSpPr>
+        <p:spPr/>
+        <p:txBody>
+          <a:bodyPr/>
+          <a:lstStyle/>
+          <a:p>
+            <a:r>
+              <a:rPr lang="en-US" dirty="0"/>
+              <a:t>Upper Pivot</a:t>
+            </a:r>
+          </a:p>
+        </p:txBody>
+      </p:sp>
+      <p:sp>
+        <p:nvSpPr>
+          <p:cNvPr id="3" name="Content Placeholder 2">
+            <a:extLst>
+              <a:ext uri="{FF2B5EF4-FFF2-40B4-BE49-F238E27FC236}">
+                <a16:creationId xmlns:a16="http://schemas.microsoft.com/office/drawing/2014/main" id="{6676B8BD-DDAC-4C57-A4EB-9D7670C4A2D9}"/>
+              </a:ext>
+            </a:extLst>
+          </p:cNvPr>
+          <p:cNvSpPr>
+            <a:spLocks noGrp="1"/>
+          </p:cNvSpPr>
+          <p:nvPr>
+            <p:ph sz="half" idx="1"/>
+          </p:nvPr>
+        </p:nvSpPr>
+        <p:spPr/>
+        <p:txBody>
+          <a:bodyPr/>
+          <a:lstStyle/>
+          <a:p>
+            <a:r>
+              <a:rPr lang="en-US" dirty="0"/>
+              <a:t>Same bearing layout as lower pivot arm.</a:t>
+            </a:r>
+          </a:p>
+          <a:p>
+            <a:r>
+              <a:rPr lang="en-US" dirty="0"/>
+              <a:t>Drilled and tapped holes for attaching an aluminum anode on each side.</a:t>
+            </a:r>
+          </a:p>
+        </p:txBody>
+      </p:sp>
+      <p:pic>
+        <p:nvPicPr>
+          <p:cNvPr id="8" name="Content Placeholder 7">
+            <a:extLst>
+              <a:ext uri="{FF2B5EF4-FFF2-40B4-BE49-F238E27FC236}">
+                <a16:creationId xmlns:a16="http://schemas.microsoft.com/office/drawing/2014/main" id="{6E845811-9509-4B3B-BA63-E20A45DDA8E2}"/>
+              </a:ext>
+            </a:extLst>
+          </p:cNvPr>
+          <p:cNvPicPr>
+            <a:picLocks noGrp="1" noChangeAspect="1"/>
+          </p:cNvPicPr>
+          <p:nvPr>
+            <p:ph sz="half" idx="2"/>
+          </p:nvPr>
+        </p:nvPicPr>
+        <p:blipFill>
+          <a:blip r:embed="rId2"/>
+          <a:stretch>
+            <a:fillRect/>
+          </a:stretch>
+        </p:blipFill>
+        <p:spPr>
+          <a:xfrm>
+            <a:off x="6705313" y="2000765"/>
+            <a:ext cx="4115374" cy="4001058"/>
+          </a:xfrm>
+          <a:prstGeom prst="rect">
+            <a:avLst/>
+          </a:prstGeom>
+        </p:spPr>
+      </p:pic>
+      <p:cxnSp>
+        <p:nvCxnSpPr>
+          <p:cNvPr id="10" name="Straight Arrow Connector 9">
+            <a:extLst>
+              <a:ext uri="{FF2B5EF4-FFF2-40B4-BE49-F238E27FC236}">
+                <a16:creationId xmlns:a16="http://schemas.microsoft.com/office/drawing/2014/main" id="{A22E6447-4CC8-48D9-909A-D961944BC467}"/>
+              </a:ext>
+            </a:extLst>
+          </p:cNvPr>
+          <p:cNvCxnSpPr/>
+          <p:nvPr/>
+        </p:nvCxnSpPr>
+        <p:spPr>
+          <a:xfrm flipH="1">
+            <a:off x="10376899" y="2691829"/>
+            <a:ext cx="236305" cy="462337"/>
+          </a:xfrm>
+          <a:prstGeom prst="straightConnector1">
+            <a:avLst/>
+          </a:prstGeom>
+          <a:ln>
+            <a:tailEnd type="triangle"/>
+          </a:ln>
+        </p:spPr>
+        <p:style>
+          <a:lnRef idx="1">
+            <a:schemeClr val="accent1"/>
+          </a:lnRef>
+          <a:fillRef idx="0">
+            <a:schemeClr val="accent1"/>
+          </a:fillRef>
+          <a:effectRef idx="0">
+            <a:schemeClr val="accent1"/>
+          </a:effectRef>
+          <a:fontRef idx="minor">
+            <a:schemeClr val="tx1"/>
+          </a:fontRef>
+        </p:style>
+      </p:cxnSp>
+      <p:sp>
+        <p:nvSpPr>
+          <p:cNvPr id="11" name="TextBox 10">
+            <a:extLst>
+              <a:ext uri="{FF2B5EF4-FFF2-40B4-BE49-F238E27FC236}">
+                <a16:creationId xmlns:a16="http://schemas.microsoft.com/office/drawing/2014/main" id="{CCE89BAF-2985-4133-9390-347BAB0C27B0}"/>
+              </a:ext>
+            </a:extLst>
+          </p:cNvPr>
+          <p:cNvSpPr txBox="1"/>
+          <p:nvPr/>
+        </p:nvSpPr>
+        <p:spPr>
+          <a:xfrm>
+            <a:off x="10284903" y="2256639"/>
+            <a:ext cx="1221297" cy="369332"/>
+          </a:xfrm>
+          <a:prstGeom prst="rect">
+            <a:avLst/>
+          </a:prstGeom>
+          <a:noFill/>
+        </p:spPr>
+        <p:txBody>
+          <a:bodyPr wrap="square" rtlCol="0">
+            <a:spAutoFit/>
+          </a:bodyPr>
+          <a:lstStyle/>
+          <a:p>
+            <a:r>
+              <a:rPr lang="en-US" dirty="0"/>
+              <a:t>Anode</a:t>
+            </a:r>
+          </a:p>
+        </p:txBody>
+      </p:sp>
+    </p:spTree>
+    <p:extLst>
+      <p:ext uri="{BB962C8B-B14F-4D97-AF65-F5344CB8AC3E}">
+        <p14:creationId xmlns:p14="http://schemas.microsoft.com/office/powerpoint/2010/main" val="3303538290"/>
+      </p:ext>
+    </p:extLst>
+  </p:cSld>
+  <p:clrMapOvr>
+    <a:masterClrMapping/>
+  </p:clrMapOvr>
+</p:sld>
+</file>
+
+<file path=ppt/slides/slide8.xml><?xml version="1.0" encoding="utf-8"?>
+<p:sld xmlns:a="http://schemas.openxmlformats.org/drawingml/2006/main" xmlns:r="http://schemas.openxmlformats.org/officeDocument/2006/relationships" xmlns:p="http://schemas.openxmlformats.org/presentationml/2006/main">
+  <p:cSld>
+    <p:spTree>
+      <p:nvGrpSpPr>
+        <p:cNvPr id="1" name=""/>
+        <p:cNvGrpSpPr/>
+        <p:nvPr/>
+      </p:nvGrpSpPr>
+      <p:grpSpPr>
+        <a:xfrm>
+          <a:off x="0" y="0"/>
+          <a:ext cx="0" cy="0"/>
+          <a:chOff x="0" y="0"/>
+          <a:chExt cx="0" cy="0"/>
+        </a:xfrm>
+      </p:grpSpPr>
+      <p:sp>
+        <p:nvSpPr>
+          <p:cNvPr id="2" name="Title 1">
+            <a:extLst>
+              <a:ext uri="{FF2B5EF4-FFF2-40B4-BE49-F238E27FC236}">
+                <a16:creationId xmlns:a16="http://schemas.microsoft.com/office/drawing/2014/main" id="{78B48FFB-D878-4B36-88FC-E45568D9E96B}"/>
+              </a:ext>
+            </a:extLst>
+          </p:cNvPr>
+          <p:cNvSpPr>
+            <a:spLocks noGrp="1"/>
+          </p:cNvSpPr>
+          <p:nvPr>
+            <p:ph type="title"/>
+          </p:nvPr>
+        </p:nvSpPr>
+        <p:spPr/>
+        <p:txBody>
+          <a:bodyPr/>
+          <a:lstStyle/>
+          <a:p>
+            <a:r>
+              <a:rPr lang="en-US" dirty="0"/>
+              <a:t>Upper Pivot</a:t>
+            </a:r>
+          </a:p>
+        </p:txBody>
+      </p:sp>
+      <p:sp>
+        <p:nvSpPr>
+          <p:cNvPr id="3" name="Content Placeholder 2">
+            <a:extLst>
+              <a:ext uri="{FF2B5EF4-FFF2-40B4-BE49-F238E27FC236}">
+                <a16:creationId xmlns:a16="http://schemas.microsoft.com/office/drawing/2014/main" id="{6676B8BD-DDAC-4C57-A4EB-9D7670C4A2D9}"/>
+              </a:ext>
+            </a:extLst>
+          </p:cNvPr>
+          <p:cNvSpPr>
+            <a:spLocks noGrp="1"/>
+          </p:cNvSpPr>
+          <p:nvPr>
+            <p:ph sz="half" idx="1"/>
+          </p:nvPr>
+        </p:nvSpPr>
+        <p:spPr/>
+        <p:txBody>
+          <a:bodyPr/>
+          <a:lstStyle/>
+          <a:p>
+            <a:r>
+              <a:rPr lang="en-US" dirty="0"/>
+              <a:t>Each side of pivot plate is doweled into place.</a:t>
+            </a:r>
+          </a:p>
+          <a:p>
+            <a:r>
+              <a:rPr lang="en-US" dirty="0"/>
+              <a:t>4 Holes for attaching to cart or boom.</a:t>
+            </a:r>
+          </a:p>
+          <a:p>
+            <a:pPr lvl="1"/>
+            <a:r>
+              <a:rPr lang="en-US" dirty="0"/>
+              <a:t>To be designed by Dillon Herbert for DOE or TBD for Manta Ray.</a:t>
+            </a:r>
+          </a:p>
+          <a:p>
+            <a:endParaRPr lang="en-US" dirty="0"/>
+          </a:p>
+        </p:txBody>
+      </p:sp>
+      <p:cxnSp>
+        <p:nvCxnSpPr>
+          <p:cNvPr id="10" name="Straight Arrow Connector 9">
+            <a:extLst>
+              <a:ext uri="{FF2B5EF4-FFF2-40B4-BE49-F238E27FC236}">
+                <a16:creationId xmlns:a16="http://schemas.microsoft.com/office/drawing/2014/main" id="{A22E6447-4CC8-48D9-909A-D961944BC467}"/>
+              </a:ext>
+            </a:extLst>
+          </p:cNvPr>
+          <p:cNvCxnSpPr/>
+          <p:nvPr/>
+        </p:nvCxnSpPr>
+        <p:spPr>
+          <a:xfrm flipH="1">
+            <a:off x="10376899" y="2691829"/>
+            <a:ext cx="236305" cy="462337"/>
+          </a:xfrm>
+          <a:prstGeom prst="straightConnector1">
+            <a:avLst/>
+          </a:prstGeom>
+          <a:ln>
+            <a:tailEnd type="triangle"/>
+          </a:ln>
+        </p:spPr>
+        <p:style>
+          <a:lnRef idx="1">
+            <a:schemeClr val="accent1"/>
+          </a:lnRef>
+          <a:fillRef idx="0">
+            <a:schemeClr val="accent1"/>
+          </a:fillRef>
+          <a:effectRef idx="0">
+            <a:schemeClr val="accent1"/>
+          </a:effectRef>
+          <a:fontRef idx="minor">
+            <a:schemeClr val="tx1"/>
+          </a:fontRef>
+        </p:style>
+      </p:cxnSp>
+      <p:sp>
+        <p:nvSpPr>
+          <p:cNvPr id="11" name="TextBox 10">
+            <a:extLst>
+              <a:ext uri="{FF2B5EF4-FFF2-40B4-BE49-F238E27FC236}">
+                <a16:creationId xmlns:a16="http://schemas.microsoft.com/office/drawing/2014/main" id="{CCE89BAF-2985-4133-9390-347BAB0C27B0}"/>
+              </a:ext>
+            </a:extLst>
+          </p:cNvPr>
+          <p:cNvSpPr txBox="1"/>
+          <p:nvPr/>
+        </p:nvSpPr>
+        <p:spPr>
+          <a:xfrm>
+            <a:off x="10284903" y="2256639"/>
+            <a:ext cx="1221297" cy="369332"/>
+          </a:xfrm>
+          <a:prstGeom prst="rect">
+            <a:avLst/>
+          </a:prstGeom>
+          <a:noFill/>
+        </p:spPr>
+        <p:txBody>
+          <a:bodyPr wrap="square" rtlCol="0">
+            <a:spAutoFit/>
+          </a:bodyPr>
+          <a:lstStyle/>
+          <a:p>
+            <a:r>
+              <a:rPr lang="en-US" dirty="0"/>
+              <a:t>Anode</a:t>
+            </a:r>
+          </a:p>
+        </p:txBody>
+      </p:sp>
+      <p:pic>
+        <p:nvPicPr>
+          <p:cNvPr id="7" name="Content Placeholder 6">
+            <a:extLst>
+              <a:ext uri="{FF2B5EF4-FFF2-40B4-BE49-F238E27FC236}">
+                <a16:creationId xmlns:a16="http://schemas.microsoft.com/office/drawing/2014/main" id="{D4E43476-53E0-4DCA-BF1E-74BC3A77AEB5}"/>
+              </a:ext>
+            </a:extLst>
+          </p:cNvPr>
+          <p:cNvPicPr>
+            <a:picLocks noGrp="1" noChangeAspect="1"/>
+          </p:cNvPicPr>
+          <p:nvPr>
+            <p:ph sz="half" idx="2"/>
+          </p:nvPr>
+        </p:nvPicPr>
+        <p:blipFill>
+          <a:blip r:embed="rId2"/>
+          <a:stretch>
+            <a:fillRect/>
+          </a:stretch>
+        </p:blipFill>
+        <p:spPr>
+          <a:xfrm>
+            <a:off x="6364748" y="1825625"/>
+            <a:ext cx="4796503" cy="4351338"/>
+          </a:xfrm>
+          <a:prstGeom prst="rect">
+            <a:avLst/>
+          </a:prstGeom>
+        </p:spPr>
+      </p:pic>
+    </p:spTree>
+    <p:extLst>
+      <p:ext uri="{BB962C8B-B14F-4D97-AF65-F5344CB8AC3E}">
+        <p14:creationId xmlns:p14="http://schemas.microsoft.com/office/powerpoint/2010/main" val="1984350779"/>
       </p:ext>
     </p:extLst>
   </p:cSld>

</xml_diff>